<commit_message>
presentation, error plots, and final results
</commit_message>
<xml_diff>
--- a/presentations/28March2023_committee.pptx
+++ b/presentations/28March2023_committee.pptx
@@ -24,9 +24,10 @@
     <p:sldId id="318" r:id="rId18"/>
     <p:sldId id="319" r:id="rId19"/>
     <p:sldId id="264" r:id="rId20"/>
-    <p:sldId id="266" r:id="rId21"/>
-    <p:sldId id="267" r:id="rId22"/>
-    <p:sldId id="272" r:id="rId23"/>
+    <p:sldId id="320" r:id="rId21"/>
+    <p:sldId id="266" r:id="rId22"/>
+    <p:sldId id="267" r:id="rId23"/>
+    <p:sldId id="272" r:id="rId24"/>
   </p:sldIdLst>
   <p:sldSz cx="12192000" cy="6858000"/>
   <p:notesSz cx="6858000" cy="9144000"/>
@@ -280,7 +281,7 @@
           <a:p>
             <a:fld id="{5078ADB6-DBA4-4B07-934A-19FBAC1437FF}" type="datetimeFigureOut">
               <a:rPr lang="en-US" smtClean="0"/>
-              <a:t>3/27/2023</a:t>
+              <a:t>3/28/2023</a:t>
             </a:fld>
             <a:endParaRPr lang="en-US"/>
           </a:p>
@@ -478,7 +479,7 @@
           <a:p>
             <a:fld id="{5078ADB6-DBA4-4B07-934A-19FBAC1437FF}" type="datetimeFigureOut">
               <a:rPr lang="en-US" smtClean="0"/>
-              <a:t>3/27/2023</a:t>
+              <a:t>3/28/2023</a:t>
             </a:fld>
             <a:endParaRPr lang="en-US"/>
           </a:p>
@@ -686,7 +687,7 @@
           <a:p>
             <a:fld id="{5078ADB6-DBA4-4B07-934A-19FBAC1437FF}" type="datetimeFigureOut">
               <a:rPr lang="en-US" smtClean="0"/>
-              <a:t>3/27/2023</a:t>
+              <a:t>3/28/2023</a:t>
             </a:fld>
             <a:endParaRPr lang="en-US"/>
           </a:p>
@@ -884,7 +885,7 @@
           <a:p>
             <a:fld id="{5078ADB6-DBA4-4B07-934A-19FBAC1437FF}" type="datetimeFigureOut">
               <a:rPr lang="en-US" smtClean="0"/>
-              <a:t>3/27/2023</a:t>
+              <a:t>3/28/2023</a:t>
             </a:fld>
             <a:endParaRPr lang="en-US"/>
           </a:p>
@@ -1159,7 +1160,7 @@
           <a:p>
             <a:fld id="{5078ADB6-DBA4-4B07-934A-19FBAC1437FF}" type="datetimeFigureOut">
               <a:rPr lang="en-US" smtClean="0"/>
-              <a:t>3/27/2023</a:t>
+              <a:t>3/28/2023</a:t>
             </a:fld>
             <a:endParaRPr lang="en-US"/>
           </a:p>
@@ -1424,7 +1425,7 @@
           <a:p>
             <a:fld id="{5078ADB6-DBA4-4B07-934A-19FBAC1437FF}" type="datetimeFigureOut">
               <a:rPr lang="en-US" smtClean="0"/>
-              <a:t>3/27/2023</a:t>
+              <a:t>3/28/2023</a:t>
             </a:fld>
             <a:endParaRPr lang="en-US"/>
           </a:p>
@@ -1836,7 +1837,7 @@
           <a:p>
             <a:fld id="{5078ADB6-DBA4-4B07-934A-19FBAC1437FF}" type="datetimeFigureOut">
               <a:rPr lang="en-US" smtClean="0"/>
-              <a:t>3/27/2023</a:t>
+              <a:t>3/28/2023</a:t>
             </a:fld>
             <a:endParaRPr lang="en-US"/>
           </a:p>
@@ -1977,7 +1978,7 @@
           <a:p>
             <a:fld id="{5078ADB6-DBA4-4B07-934A-19FBAC1437FF}" type="datetimeFigureOut">
               <a:rPr lang="en-US" smtClean="0"/>
-              <a:t>3/27/2023</a:t>
+              <a:t>3/28/2023</a:t>
             </a:fld>
             <a:endParaRPr lang="en-US"/>
           </a:p>
@@ -2090,7 +2091,7 @@
           <a:p>
             <a:fld id="{5078ADB6-DBA4-4B07-934A-19FBAC1437FF}" type="datetimeFigureOut">
               <a:rPr lang="en-US" smtClean="0"/>
-              <a:t>3/27/2023</a:t>
+              <a:t>3/28/2023</a:t>
             </a:fld>
             <a:endParaRPr lang="en-US"/>
           </a:p>
@@ -2401,7 +2402,7 @@
           <a:p>
             <a:fld id="{5078ADB6-DBA4-4B07-934A-19FBAC1437FF}" type="datetimeFigureOut">
               <a:rPr lang="en-US" smtClean="0"/>
-              <a:t>3/27/2023</a:t>
+              <a:t>3/28/2023</a:t>
             </a:fld>
             <a:endParaRPr lang="en-US"/>
           </a:p>
@@ -2689,7 +2690,7 @@
           <a:p>
             <a:fld id="{5078ADB6-DBA4-4B07-934A-19FBAC1437FF}" type="datetimeFigureOut">
               <a:rPr lang="en-US" smtClean="0"/>
-              <a:t>3/27/2023</a:t>
+              <a:t>3/28/2023</a:t>
             </a:fld>
             <a:endParaRPr lang="en-US"/>
           </a:p>
@@ -2930,7 +2931,7 @@
           <a:p>
             <a:fld id="{5078ADB6-DBA4-4B07-934A-19FBAC1437FF}" type="datetimeFigureOut">
               <a:rPr lang="en-US" smtClean="0"/>
-              <a:t>3/27/2023</a:t>
+              <a:t>3/28/2023</a:t>
             </a:fld>
             <a:endParaRPr lang="en-US"/>
           </a:p>
@@ -8099,6 +8100,137 @@
           <a:chExt cx="0" cy="0"/>
         </a:xfrm>
       </p:grpSpPr>
+      <p:sp>
+        <p:nvSpPr>
+          <p:cNvPr id="4" name="Subtitle 2">
+            <a:extLst>
+              <a:ext uri="{FF2B5EF4-FFF2-40B4-BE49-F238E27FC236}">
+                <a16:creationId xmlns:a16="http://schemas.microsoft.com/office/drawing/2014/main" id="{E6CBF411-072C-CF3F-26DF-B042F88282BA}"/>
+              </a:ext>
+            </a:extLst>
+          </p:cNvPr>
+          <p:cNvSpPr>
+            <a:spLocks noGrp="1"/>
+          </p:cNvSpPr>
+          <p:nvPr>
+            <p:ph type="subTitle" idx="1"/>
+          </p:nvPr>
+        </p:nvSpPr>
+        <p:spPr>
+          <a:xfrm>
+            <a:off x="1038861" y="1319034"/>
+            <a:ext cx="9625825" cy="4614627"/>
+          </a:xfrm>
+        </p:spPr>
+        <p:txBody>
+          <a:bodyPr>
+            <a:normAutofit/>
+          </a:bodyPr>
+          <a:lstStyle/>
+          <a:p>
+            <a:pPr algn="l"/>
+            <a:r>
+              <a:rPr lang="en-US" sz="3600" dirty="0">
+                <a:solidFill>
+                  <a:schemeClr val="bg1"/>
+                </a:solidFill>
+              </a:rPr>
+              <a:t>Questions</a:t>
+            </a:r>
+          </a:p>
+          <a:p>
+            <a:pPr marL="571500" indent="-571500" algn="l">
+              <a:buFontTx/>
+              <a:buChar char="-"/>
+            </a:pPr>
+            <a:r>
+              <a:rPr lang="en-US" sz="3600" dirty="0">
+                <a:solidFill>
+                  <a:schemeClr val="bg1"/>
+                </a:solidFill>
+              </a:rPr>
+              <a:t>What errors to present?</a:t>
+            </a:r>
+          </a:p>
+          <a:p>
+            <a:pPr marL="571500" indent="-571500" algn="l">
+              <a:buFontTx/>
+              <a:buChar char="-"/>
+            </a:pPr>
+            <a:r>
+              <a:rPr lang="en-US" sz="3600" dirty="0">
+                <a:solidFill>
+                  <a:schemeClr val="bg1"/>
+                </a:solidFill>
+              </a:rPr>
+              <a:t>What time metric to present?</a:t>
+            </a:r>
+          </a:p>
+          <a:p>
+            <a:pPr marL="571500" indent="-571500" algn="l">
+              <a:buFontTx/>
+              <a:buChar char="-"/>
+            </a:pPr>
+            <a:endParaRPr lang="en-US" sz="3600" dirty="0">
+              <a:solidFill>
+                <a:schemeClr val="bg1"/>
+              </a:solidFill>
+            </a:endParaRPr>
+          </a:p>
+          <a:p>
+            <a:pPr marL="571500" indent="-571500" algn="l">
+              <a:buFontTx/>
+              <a:buChar char="-"/>
+            </a:pPr>
+            <a:r>
+              <a:rPr lang="en-US" sz="3600" dirty="0">
+                <a:solidFill>
+                  <a:schemeClr val="bg1"/>
+                </a:solidFill>
+              </a:rPr>
+              <a:t>Other open advice from committee</a:t>
+            </a:r>
+          </a:p>
+        </p:txBody>
+      </p:sp>
+    </p:spTree>
+    <p:extLst>
+      <p:ext uri="{BB962C8B-B14F-4D97-AF65-F5344CB8AC3E}">
+        <p14:creationId xmlns:p14="http://schemas.microsoft.com/office/powerpoint/2010/main" val="1082312482"/>
+      </p:ext>
+    </p:extLst>
+  </p:cSld>
+  <p:clrMapOvr>
+    <a:masterClrMapping/>
+  </p:clrMapOvr>
+</p:sld>
+</file>
+
+<file path=ppt/slides/slide21.xml><?xml version="1.0" encoding="utf-8"?>
+<p:sld xmlns:a="http://schemas.openxmlformats.org/drawingml/2006/main" xmlns:r="http://schemas.openxmlformats.org/officeDocument/2006/relationships" xmlns:p="http://schemas.openxmlformats.org/presentationml/2006/main">
+  <p:cSld>
+    <p:bg>
+      <p:bgPr>
+        <a:solidFill>
+          <a:schemeClr val="tx1"/>
+        </a:solidFill>
+        <a:effectLst/>
+      </p:bgPr>
+    </p:bg>
+    <p:spTree>
+      <p:nvGrpSpPr>
+        <p:cNvPr id="1" name=""/>
+        <p:cNvGrpSpPr/>
+        <p:nvPr/>
+      </p:nvGrpSpPr>
+      <p:grpSpPr>
+        <a:xfrm>
+          <a:off x="0" y="0"/>
+          <a:ext cx="0" cy="0"/>
+          <a:chOff x="0" y="0"/>
+          <a:chExt cx="0" cy="0"/>
+        </a:xfrm>
+      </p:grpSpPr>
       <p:pic>
         <p:nvPicPr>
           <p:cNvPr id="12" name="Picture 11">
@@ -8777,7 +8909,7 @@
 </p:sld>
 </file>
 
-<file path=ppt/slides/slide21.xml><?xml version="1.0" encoding="utf-8"?>
+<file path=ppt/slides/slide22.xml><?xml version="1.0" encoding="utf-8"?>
 <p:sld xmlns:a="http://schemas.openxmlformats.org/drawingml/2006/main" xmlns:r="http://schemas.openxmlformats.org/officeDocument/2006/relationships" xmlns:p="http://schemas.openxmlformats.org/presentationml/2006/main">
   <p:cSld>
     <p:bg>
@@ -9504,7 +9636,7 @@
 </p:sld>
 </file>
 
-<file path=ppt/slides/slide22.xml><?xml version="1.0" encoding="utf-8"?>
+<file path=ppt/slides/slide23.xml><?xml version="1.0" encoding="utf-8"?>
 <p:sld xmlns:a="http://schemas.openxmlformats.org/drawingml/2006/main" xmlns:r="http://schemas.openxmlformats.org/officeDocument/2006/relationships" xmlns:p="http://schemas.openxmlformats.org/presentationml/2006/main">
   <p:cSld>
     <p:bg>

</xml_diff>